<commit_message>
20250115 1130 File Distribution
</commit_message>
<xml_diff>
--- a/GitHub.pptx
+++ b/GitHub.pptx
@@ -5353,6 +5353,325 @@
           </a:p>
         </p:txBody>
       </p:sp>
+      <p:sp>
+        <p:nvSpPr>
+          <p:cNvPr id="4" name="TextBox 3">
+            <a:extLst>
+              <a:ext uri="{FF2B5EF4-FFF2-40B4-BE49-F238E27FC236}">
+                <a16:creationId xmlns:a16="http://schemas.microsoft.com/office/drawing/2014/main" id="{E41BBA1C-667F-4B5B-9D14-CB2A2AABAA52}"/>
+              </a:ext>
+            </a:extLst>
+          </p:cNvPr>
+          <p:cNvSpPr txBox="1"/>
+          <p:nvPr/>
+        </p:nvSpPr>
+        <p:spPr>
+          <a:xfrm>
+            <a:off x="152400" y="2669361"/>
+            <a:ext cx="3283271" cy="1323439"/>
+          </a:xfrm>
+          <a:prstGeom prst="rect">
+            <a:avLst/>
+          </a:prstGeom>
+          <a:noFill/>
+        </p:spPr>
+        <p:txBody>
+          <a:bodyPr wrap="none" rtlCol="0">
+            <a:spAutoFit/>
+          </a:bodyPr>
+          <a:lstStyle/>
+          <a:p>
+            <a:r>
+              <a:rPr lang="en-US" altLang="ko-KR" sz="2000" b="1"/>
+              <a:t>Git</a:t>
+            </a:r>
+            <a:r>
+              <a:rPr lang="ko-KR" altLang="en-US" sz="2000" b="1"/>
+              <a:t>에서 커밋명을 확인하기</a:t>
+            </a:r>
+            <a:endParaRPr lang="en-US" altLang="ko-KR" sz="2000" b="1"/>
+          </a:p>
+          <a:p>
+            <a:r>
+              <a:rPr lang="en-US" altLang="ko-KR" sz="2000"/>
+              <a:t>git log</a:t>
+            </a:r>
+          </a:p>
+          <a:p>
+            <a:r>
+              <a:rPr lang="en-US" altLang="ko-KR" sz="2000"/>
+              <a:t>git log –oneline</a:t>
+            </a:r>
+          </a:p>
+          <a:p>
+            <a:r>
+              <a:rPr lang="en-US" altLang="ko-KR" sz="2000"/>
+              <a:t>git show</a:t>
+            </a:r>
+          </a:p>
+        </p:txBody>
+      </p:sp>
+      <p:sp>
+        <p:nvSpPr>
+          <p:cNvPr id="2" name="TextBox 1">
+            <a:extLst>
+              <a:ext uri="{FF2B5EF4-FFF2-40B4-BE49-F238E27FC236}">
+                <a16:creationId xmlns:a16="http://schemas.microsoft.com/office/drawing/2014/main" id="{48669E77-41E7-43E3-8FB2-6F621EB7BC23}"/>
+              </a:ext>
+            </a:extLst>
+          </p:cNvPr>
+          <p:cNvSpPr txBox="1"/>
+          <p:nvPr/>
+        </p:nvSpPr>
+        <p:spPr>
+          <a:xfrm>
+            <a:off x="2143662" y="3032791"/>
+            <a:ext cx="4195379" cy="307777"/>
+          </a:xfrm>
+          <a:prstGeom prst="rect">
+            <a:avLst/>
+          </a:prstGeom>
+          <a:noFill/>
+        </p:spPr>
+        <p:txBody>
+          <a:bodyPr wrap="none" rtlCol="0">
+            <a:spAutoFit/>
+          </a:bodyPr>
+          <a:lstStyle/>
+          <a:p>
+            <a:r>
+              <a:rPr lang="ko-KR" altLang="en-US" sz="1400" b="0" i="0">
+                <a:solidFill>
+                  <a:schemeClr val="accent1"/>
+                </a:solidFill>
+                <a:effectLst/>
+                <a:latin typeface="__fkGroteskNeue_598ab8"/>
+              </a:rPr>
+              <a:t>현재 브랜치의 모든 커밋 이력을 시간순으로 보여줌</a:t>
+            </a:r>
+            <a:endParaRPr lang="ko-KR" altLang="en-US" sz="1400">
+              <a:solidFill>
+                <a:schemeClr val="accent1"/>
+              </a:solidFill>
+            </a:endParaRPr>
+          </a:p>
+        </p:txBody>
+      </p:sp>
+      <p:sp>
+        <p:nvSpPr>
+          <p:cNvPr id="6" name="TextBox 5">
+            <a:extLst>
+              <a:ext uri="{FF2B5EF4-FFF2-40B4-BE49-F238E27FC236}">
+                <a16:creationId xmlns:a16="http://schemas.microsoft.com/office/drawing/2014/main" id="{DFD30B8C-4EE9-4145-8179-C67A37BE42C2}"/>
+              </a:ext>
+            </a:extLst>
+          </p:cNvPr>
+          <p:cNvSpPr txBox="1"/>
+          <p:nvPr/>
+        </p:nvSpPr>
+        <p:spPr>
+          <a:xfrm>
+            <a:off x="2143662" y="3340568"/>
+            <a:ext cx="4814138" cy="307777"/>
+          </a:xfrm>
+          <a:prstGeom prst="rect">
+            <a:avLst/>
+          </a:prstGeom>
+          <a:noFill/>
+        </p:spPr>
+        <p:txBody>
+          <a:bodyPr wrap="none" rtlCol="0">
+            <a:spAutoFit/>
+          </a:bodyPr>
+          <a:lstStyle/>
+          <a:p>
+            <a:r>
+              <a:rPr lang="ko-KR" altLang="en-US" sz="1400" b="0" i="0">
+                <a:solidFill>
+                  <a:schemeClr val="accent1"/>
+                </a:solidFill>
+                <a:effectLst/>
+                <a:latin typeface="__fkGroteskNeue_598ab8"/>
+              </a:rPr>
+              <a:t>간단히 각 커밋의 해시와 메시지를 한 줄로 요약해서 보여줌</a:t>
+            </a:r>
+            <a:endParaRPr lang="ko-KR" altLang="en-US" sz="1400">
+              <a:solidFill>
+                <a:schemeClr val="accent1"/>
+              </a:solidFill>
+            </a:endParaRPr>
+          </a:p>
+        </p:txBody>
+      </p:sp>
+      <p:sp>
+        <p:nvSpPr>
+          <p:cNvPr id="7" name="TextBox 6">
+            <a:extLst>
+              <a:ext uri="{FF2B5EF4-FFF2-40B4-BE49-F238E27FC236}">
+                <a16:creationId xmlns:a16="http://schemas.microsoft.com/office/drawing/2014/main" id="{01867AD2-0031-42C5-96BC-5C9653FDD729}"/>
+              </a:ext>
+            </a:extLst>
+          </p:cNvPr>
+          <p:cNvSpPr txBox="1"/>
+          <p:nvPr/>
+        </p:nvSpPr>
+        <p:spPr>
+          <a:xfrm>
+            <a:off x="2143662" y="3648345"/>
+            <a:ext cx="6146234" cy="307777"/>
+          </a:xfrm>
+          <a:prstGeom prst="rect">
+            <a:avLst/>
+          </a:prstGeom>
+          <a:noFill/>
+        </p:spPr>
+        <p:txBody>
+          <a:bodyPr wrap="none" rtlCol="0">
+            <a:spAutoFit/>
+          </a:bodyPr>
+          <a:lstStyle/>
+          <a:p>
+            <a:r>
+              <a:rPr lang="ko-KR" altLang="en-US" sz="1400" b="0" i="0">
+                <a:solidFill>
+                  <a:schemeClr val="accent1"/>
+                </a:solidFill>
+                <a:effectLst/>
+                <a:latin typeface="__fkGroteskNeue_598ab8"/>
+              </a:rPr>
+              <a:t>커밋 해시를 지정하여 사용</a:t>
+            </a:r>
+            <a:r>
+              <a:rPr lang="en-US" altLang="ko-KR" sz="1400" b="0" i="0">
+                <a:solidFill>
+                  <a:schemeClr val="accent1"/>
+                </a:solidFill>
+                <a:effectLst/>
+                <a:latin typeface="__fkGroteskNeue_598ab8"/>
+              </a:rPr>
+              <a:t>,</a:t>
+            </a:r>
+            <a:r>
+              <a:rPr lang="ko-KR" altLang="en-US" sz="1400" b="0" i="0">
+                <a:solidFill>
+                  <a:schemeClr val="accent1"/>
+                </a:solidFill>
+                <a:effectLst/>
+                <a:latin typeface="__fkGroteskNeue_598ab8"/>
+              </a:rPr>
+              <a:t> 해당 커밋의 변경 사항</a:t>
+            </a:r>
+            <a:r>
+              <a:rPr lang="en-US" altLang="ko-KR" sz="1400" b="0" i="0">
+                <a:solidFill>
+                  <a:schemeClr val="accent1"/>
+                </a:solidFill>
+                <a:effectLst/>
+                <a:latin typeface="__fkGroteskNeue_598ab8"/>
+              </a:rPr>
+              <a:t>, </a:t>
+            </a:r>
+            <a:r>
+              <a:rPr lang="ko-KR" altLang="en-US" sz="1400" b="0" i="0">
+                <a:solidFill>
+                  <a:schemeClr val="accent1"/>
+                </a:solidFill>
+                <a:effectLst/>
+                <a:latin typeface="__fkGroteskNeue_598ab8"/>
+              </a:rPr>
+              <a:t>메시지</a:t>
+            </a:r>
+            <a:r>
+              <a:rPr lang="en-US" altLang="ko-KR" sz="1400" b="0" i="0">
+                <a:solidFill>
+                  <a:schemeClr val="accent1"/>
+                </a:solidFill>
+                <a:effectLst/>
+                <a:latin typeface="__fkGroteskNeue_598ab8"/>
+              </a:rPr>
+              <a:t>, </a:t>
+            </a:r>
+            <a:r>
+              <a:rPr lang="ko-KR" altLang="en-US" sz="1400" b="0" i="0">
+                <a:solidFill>
+                  <a:schemeClr val="accent1"/>
+                </a:solidFill>
+                <a:effectLst/>
+                <a:latin typeface="__fkGroteskNeue_598ab8"/>
+              </a:rPr>
+              <a:t>저자 정보를 보여</a:t>
+            </a:r>
+            <a:endParaRPr lang="ko-KR" altLang="en-US" sz="1400">
+              <a:solidFill>
+                <a:schemeClr val="accent1"/>
+              </a:solidFill>
+            </a:endParaRPr>
+          </a:p>
+        </p:txBody>
+      </p:sp>
+      <p:sp>
+        <p:nvSpPr>
+          <p:cNvPr id="8" name="TextBox 7">
+            <a:extLst>
+              <a:ext uri="{FF2B5EF4-FFF2-40B4-BE49-F238E27FC236}">
+                <a16:creationId xmlns:a16="http://schemas.microsoft.com/office/drawing/2014/main" id="{B09ECF73-2E2A-478D-89F9-892678709205}"/>
+              </a:ext>
+            </a:extLst>
+          </p:cNvPr>
+          <p:cNvSpPr txBox="1"/>
+          <p:nvPr/>
+        </p:nvSpPr>
+        <p:spPr>
+          <a:xfrm>
+            <a:off x="152400" y="3961259"/>
+            <a:ext cx="2577950" cy="307777"/>
+          </a:xfrm>
+          <a:prstGeom prst="rect">
+            <a:avLst/>
+          </a:prstGeom>
+          <a:noFill/>
+        </p:spPr>
+        <p:txBody>
+          <a:bodyPr wrap="none" rtlCol="0">
+            <a:spAutoFit/>
+          </a:bodyPr>
+          <a:lstStyle/>
+          <a:p>
+            <a:r>
+              <a:rPr lang="ko-KR" altLang="en-US" sz="1400">
+                <a:solidFill>
+                  <a:schemeClr val="accent1"/>
+                </a:solidFill>
+              </a:rPr>
+              <a:t>나갈땐 </a:t>
+            </a:r>
+            <a:r>
+              <a:rPr lang="en-US" altLang="ko-KR" sz="1400">
+                <a:solidFill>
+                  <a:schemeClr val="accent1"/>
+                </a:solidFill>
+              </a:rPr>
+              <a:t>‘q’</a:t>
+            </a:r>
+            <a:r>
+              <a:rPr lang="ko-KR" altLang="en-US" sz="1400">
+                <a:solidFill>
+                  <a:schemeClr val="accent1"/>
+                </a:solidFill>
+              </a:rPr>
+              <a:t>버튼을 누르면 된다</a:t>
+            </a:r>
+            <a:r>
+              <a:rPr lang="en-US" altLang="ko-KR" sz="1400">
+                <a:solidFill>
+                  <a:schemeClr val="accent1"/>
+                </a:solidFill>
+              </a:rPr>
+              <a:t>.</a:t>
+            </a:r>
+          </a:p>
+        </p:txBody>
+      </p:sp>
     </p:spTree>
     <p:extLst>
       <p:ext uri="{BB962C8B-B14F-4D97-AF65-F5344CB8AC3E}">

</xml_diff>

<commit_message>
250131 1150 Add annotation
</commit_message>
<xml_diff>
--- a/GitHub.pptx
+++ b/GitHub.pptx
@@ -264,7 +264,7 @@
           <a:p>
             <a:fld id="{79D1AB86-D3B5-4BF0-AEF3-CE57FCEC80F8}" type="datetimeFigureOut">
               <a:rPr lang="ko-KR" altLang="en-US" smtClean="0"/>
-              <a:t>2025-01-16</a:t>
+              <a:t>2025-01-31</a:t>
             </a:fld>
             <a:endParaRPr lang="ko-KR" altLang="en-US"/>
           </a:p>
@@ -462,7 +462,7 @@
           <a:p>
             <a:fld id="{79D1AB86-D3B5-4BF0-AEF3-CE57FCEC80F8}" type="datetimeFigureOut">
               <a:rPr lang="ko-KR" altLang="en-US" smtClean="0"/>
-              <a:t>2025-01-16</a:t>
+              <a:t>2025-01-31</a:t>
             </a:fld>
             <a:endParaRPr lang="ko-KR" altLang="en-US"/>
           </a:p>
@@ -670,7 +670,7 @@
           <a:p>
             <a:fld id="{79D1AB86-D3B5-4BF0-AEF3-CE57FCEC80F8}" type="datetimeFigureOut">
               <a:rPr lang="ko-KR" altLang="en-US" smtClean="0"/>
-              <a:t>2025-01-16</a:t>
+              <a:t>2025-01-31</a:t>
             </a:fld>
             <a:endParaRPr lang="ko-KR" altLang="en-US"/>
           </a:p>
@@ -868,7 +868,7 @@
           <a:p>
             <a:fld id="{79D1AB86-D3B5-4BF0-AEF3-CE57FCEC80F8}" type="datetimeFigureOut">
               <a:rPr lang="ko-KR" altLang="en-US" smtClean="0"/>
-              <a:t>2025-01-16</a:t>
+              <a:t>2025-01-31</a:t>
             </a:fld>
             <a:endParaRPr lang="ko-KR" altLang="en-US"/>
           </a:p>
@@ -1143,7 +1143,7 @@
           <a:p>
             <a:fld id="{79D1AB86-D3B5-4BF0-AEF3-CE57FCEC80F8}" type="datetimeFigureOut">
               <a:rPr lang="ko-KR" altLang="en-US" smtClean="0"/>
-              <a:t>2025-01-16</a:t>
+              <a:t>2025-01-31</a:t>
             </a:fld>
             <a:endParaRPr lang="ko-KR" altLang="en-US"/>
           </a:p>
@@ -1408,7 +1408,7 @@
           <a:p>
             <a:fld id="{79D1AB86-D3B5-4BF0-AEF3-CE57FCEC80F8}" type="datetimeFigureOut">
               <a:rPr lang="ko-KR" altLang="en-US" smtClean="0"/>
-              <a:t>2025-01-16</a:t>
+              <a:t>2025-01-31</a:t>
             </a:fld>
             <a:endParaRPr lang="ko-KR" altLang="en-US"/>
           </a:p>
@@ -1820,7 +1820,7 @@
           <a:p>
             <a:fld id="{79D1AB86-D3B5-4BF0-AEF3-CE57FCEC80F8}" type="datetimeFigureOut">
               <a:rPr lang="ko-KR" altLang="en-US" smtClean="0"/>
-              <a:t>2025-01-16</a:t>
+              <a:t>2025-01-31</a:t>
             </a:fld>
             <a:endParaRPr lang="ko-KR" altLang="en-US"/>
           </a:p>
@@ -1961,7 +1961,7 @@
           <a:p>
             <a:fld id="{79D1AB86-D3B5-4BF0-AEF3-CE57FCEC80F8}" type="datetimeFigureOut">
               <a:rPr lang="ko-KR" altLang="en-US" smtClean="0"/>
-              <a:t>2025-01-16</a:t>
+              <a:t>2025-01-31</a:t>
             </a:fld>
             <a:endParaRPr lang="ko-KR" altLang="en-US"/>
           </a:p>
@@ -2074,7 +2074,7 @@
           <a:p>
             <a:fld id="{79D1AB86-D3B5-4BF0-AEF3-CE57FCEC80F8}" type="datetimeFigureOut">
               <a:rPr lang="ko-KR" altLang="en-US" smtClean="0"/>
-              <a:t>2025-01-16</a:t>
+              <a:t>2025-01-31</a:t>
             </a:fld>
             <a:endParaRPr lang="ko-KR" altLang="en-US"/>
           </a:p>
@@ -2385,7 +2385,7 @@
           <a:p>
             <a:fld id="{79D1AB86-D3B5-4BF0-AEF3-CE57FCEC80F8}" type="datetimeFigureOut">
               <a:rPr lang="ko-KR" altLang="en-US" smtClean="0"/>
-              <a:t>2025-01-16</a:t>
+              <a:t>2025-01-31</a:t>
             </a:fld>
             <a:endParaRPr lang="ko-KR" altLang="en-US"/>
           </a:p>
@@ -2673,7 +2673,7 @@
           <a:p>
             <a:fld id="{79D1AB86-D3B5-4BF0-AEF3-CE57FCEC80F8}" type="datetimeFigureOut">
               <a:rPr lang="ko-KR" altLang="en-US" smtClean="0"/>
-              <a:t>2025-01-16</a:t>
+              <a:t>2025-01-31</a:t>
             </a:fld>
             <a:endParaRPr lang="ko-KR" altLang="en-US"/>
           </a:p>
@@ -2914,7 +2914,7 @@
           <a:p>
             <a:fld id="{79D1AB86-D3B5-4BF0-AEF3-CE57FCEC80F8}" type="datetimeFigureOut">
               <a:rPr lang="ko-KR" altLang="en-US" smtClean="0"/>
-              <a:t>2025-01-16</a:t>
+              <a:t>2025-01-31</a:t>
             </a:fld>
             <a:endParaRPr lang="ko-KR" altLang="en-US"/>
           </a:p>
@@ -5818,6 +5818,106 @@
           </a:p>
         </p:txBody>
       </p:sp>
+      <p:sp>
+        <p:nvSpPr>
+          <p:cNvPr id="12" name="TextBox 11">
+            <a:extLst>
+              <a:ext uri="{FF2B5EF4-FFF2-40B4-BE49-F238E27FC236}">
+                <a16:creationId xmlns:a16="http://schemas.microsoft.com/office/drawing/2014/main" id="{269648F5-F73C-4F56-9D4E-1724B607193B}"/>
+              </a:ext>
+            </a:extLst>
+          </p:cNvPr>
+          <p:cNvSpPr txBox="1"/>
+          <p:nvPr/>
+        </p:nvSpPr>
+        <p:spPr>
+          <a:xfrm>
+            <a:off x="6339041" y="4271950"/>
+            <a:ext cx="4647426" cy="707886"/>
+          </a:xfrm>
+          <a:prstGeom prst="rect">
+            <a:avLst/>
+          </a:prstGeom>
+          <a:noFill/>
+        </p:spPr>
+        <p:txBody>
+          <a:bodyPr wrap="none" rtlCol="0">
+            <a:spAutoFit/>
+          </a:bodyPr>
+          <a:lstStyle/>
+          <a:p>
+            <a:r>
+              <a:rPr lang="ko-KR" altLang="en-US" sz="2000" b="1"/>
+              <a:t>스테이징 되지 않은 변경사항 되돌리기</a:t>
+            </a:r>
+            <a:endParaRPr lang="en-US" altLang="ko-KR" sz="2000" b="1"/>
+          </a:p>
+          <a:p>
+            <a:r>
+              <a:rPr lang="en-US" altLang="ko-KR" sz="2000" b="0" i="0">
+                <a:effectLst/>
+              </a:rPr>
+              <a:t>git checkout -- &lt;</a:t>
+            </a:r>
+            <a:r>
+              <a:rPr lang="ko-KR" altLang="en-US" sz="2000" b="0" i="0">
+                <a:effectLst/>
+              </a:rPr>
+              <a:t>파일명</a:t>
+            </a:r>
+            <a:r>
+              <a:rPr lang="en-US" altLang="ko-KR" sz="2000" b="0" i="0">
+                <a:effectLst/>
+              </a:rPr>
+              <a:t>&gt;</a:t>
+            </a:r>
+          </a:p>
+        </p:txBody>
+      </p:sp>
+      <p:sp>
+        <p:nvSpPr>
+          <p:cNvPr id="13" name="TextBox 12">
+            <a:extLst>
+              <a:ext uri="{FF2B5EF4-FFF2-40B4-BE49-F238E27FC236}">
+                <a16:creationId xmlns:a16="http://schemas.microsoft.com/office/drawing/2014/main" id="{37272D84-147F-4BEE-8D64-B37C3467C310}"/>
+              </a:ext>
+            </a:extLst>
+          </p:cNvPr>
+          <p:cNvSpPr txBox="1"/>
+          <p:nvPr/>
+        </p:nvSpPr>
+        <p:spPr>
+          <a:xfrm>
+            <a:off x="6339041" y="5025622"/>
+            <a:ext cx="5250155" cy="707886"/>
+          </a:xfrm>
+          <a:prstGeom prst="rect">
+            <a:avLst/>
+          </a:prstGeom>
+          <a:noFill/>
+        </p:spPr>
+        <p:txBody>
+          <a:bodyPr wrap="none" rtlCol="0">
+            <a:spAutoFit/>
+          </a:bodyPr>
+          <a:lstStyle/>
+          <a:p>
+            <a:r>
+              <a:rPr lang="ko-KR" altLang="en-US" sz="2000" b="1"/>
+              <a:t>스테이징 되지 않은 모든 변경사항 되돌리기</a:t>
+            </a:r>
+            <a:endParaRPr lang="en-US" altLang="ko-KR" sz="2000" b="1"/>
+          </a:p>
+          <a:p>
+            <a:r>
+              <a:rPr lang="en-US" altLang="ko-KR" sz="2000" b="0" i="0">
+                <a:effectLst/>
+              </a:rPr>
+              <a:t>git checkout -- .</a:t>
+            </a:r>
+          </a:p>
+        </p:txBody>
+      </p:sp>
     </p:spTree>
     <p:extLst>
       <p:ext uri="{BB962C8B-B14F-4D97-AF65-F5344CB8AC3E}">

</xml_diff>